<commit_message>
Modify unit diagram figure
</commit_message>
<xml_diff>
--- a/documents/design_specification/ユニット構造図_開発1.pptx
+++ b/documents/design_specification/ユニット構造図_開発1.pptx
@@ -126,6 +126,7 @@
 <file path=ppt/revisionInfo.xml><?xml version="1.0" encoding="utf-8"?>
 <p1510:revInfo xmlns:a="http://schemas.openxmlformats.org/drawingml/2006/main" xmlns:r="http://schemas.openxmlformats.org/officeDocument/2006/relationships" xmlns:p1510="http://schemas.microsoft.com/office/powerpoint/2015/10/main">
   <p1510:revLst>
+    <p1510:client id="{48FBA1EA-6036-4710-8B2F-1A1BB3DF75BF}" v="6" dt="2024-06-26T07:31:47.423"/>
     <p1510:client id="{B562D3B4-612A-4B2E-8877-07FBDD53C925}" v="68" dt="2024-06-26T06:28:43.697"/>
   </p1510:revLst>
 </p1510:revInfo>
@@ -135,23 +136,255 @@
 <pc:chgInfo xmlns:a="http://schemas.openxmlformats.org/drawingml/2006/main" xmlns:r="http://schemas.openxmlformats.org/officeDocument/2006/relationships" xmlns:ac="http://schemas.microsoft.com/office/drawing/2013/main/command" xmlns:pc="http://schemas.microsoft.com/office/powerpoint/2013/main/command">
   <pc:docChgLst>
     <pc:chgData name="Yusuke Funabashi" userId="273debb854664e28" providerId="LiveId" clId="{48FBA1EA-6036-4710-8B2F-1A1BB3DF75BF}"/>
-    <pc:docChg chg="modSld">
-      <pc:chgData name="Yusuke Funabashi" userId="273debb854664e28" providerId="LiveId" clId="{48FBA1EA-6036-4710-8B2F-1A1BB3DF75BF}" dt="2024-06-26T06:41:41.459" v="0" actId="14100"/>
+    <pc:docChg chg="undo custSel modSld">
+      <pc:chgData name="Yusuke Funabashi" userId="273debb854664e28" providerId="LiveId" clId="{48FBA1EA-6036-4710-8B2F-1A1BB3DF75BF}" dt="2024-06-26T07:31:47.423" v="106" actId="164"/>
       <pc:docMkLst>
         <pc:docMk/>
       </pc:docMkLst>
-      <pc:sldChg chg="modSp mod">
-        <pc:chgData name="Yusuke Funabashi" userId="273debb854664e28" providerId="LiveId" clId="{48FBA1EA-6036-4710-8B2F-1A1BB3DF75BF}" dt="2024-06-26T06:41:41.459" v="0" actId="14100"/>
+      <pc:sldChg chg="addSp delSp modSp mod">
+        <pc:chgData name="Yusuke Funabashi" userId="273debb854664e28" providerId="LiveId" clId="{48FBA1EA-6036-4710-8B2F-1A1BB3DF75BF}" dt="2024-06-26T07:31:47.423" v="106" actId="164"/>
         <pc:sldMkLst>
           <pc:docMk/>
           <pc:sldMk cId="3628565597" sldId="256"/>
         </pc:sldMkLst>
-        <pc:cxnChg chg="mod">
-          <ac:chgData name="Yusuke Funabashi" userId="273debb854664e28" providerId="LiveId" clId="{48FBA1EA-6036-4710-8B2F-1A1BB3DF75BF}" dt="2024-06-26T06:41:41.459" v="0" actId="14100"/>
+        <pc:spChg chg="mod topLvl">
+          <ac:chgData name="Yusuke Funabashi" userId="273debb854664e28" providerId="LiveId" clId="{48FBA1EA-6036-4710-8B2F-1A1BB3DF75BF}" dt="2024-06-26T07:31:47.423" v="106" actId="164"/>
+          <ac:spMkLst>
+            <pc:docMk/>
+            <pc:sldMk cId="3628565597" sldId="256"/>
+            <ac:spMk id="5" creationId="{7B7581DB-14F3-567D-27AA-06077D246E3F}"/>
+          </ac:spMkLst>
+        </pc:spChg>
+        <pc:spChg chg="mod topLvl">
+          <ac:chgData name="Yusuke Funabashi" userId="273debb854664e28" providerId="LiveId" clId="{48FBA1EA-6036-4710-8B2F-1A1BB3DF75BF}" dt="2024-06-26T07:31:47.423" v="106" actId="164"/>
+          <ac:spMkLst>
+            <pc:docMk/>
+            <pc:sldMk cId="3628565597" sldId="256"/>
+            <ac:spMk id="8" creationId="{71B7ABFF-DFFB-C2A5-86DC-391B6B26640E}"/>
+          </ac:spMkLst>
+        </pc:spChg>
+        <pc:spChg chg="mod topLvl">
+          <ac:chgData name="Yusuke Funabashi" userId="273debb854664e28" providerId="LiveId" clId="{48FBA1EA-6036-4710-8B2F-1A1BB3DF75BF}" dt="2024-06-26T07:31:47.423" v="106" actId="164"/>
+          <ac:spMkLst>
+            <pc:docMk/>
+            <pc:sldMk cId="3628565597" sldId="256"/>
+            <ac:spMk id="15" creationId="{D70E8600-7F7D-5071-B078-A2E636ABCF18}"/>
+          </ac:spMkLst>
+        </pc:spChg>
+        <pc:spChg chg="mod topLvl">
+          <ac:chgData name="Yusuke Funabashi" userId="273debb854664e28" providerId="LiveId" clId="{48FBA1EA-6036-4710-8B2F-1A1BB3DF75BF}" dt="2024-06-26T07:31:47.423" v="106" actId="164"/>
+          <ac:spMkLst>
+            <pc:docMk/>
+            <pc:sldMk cId="3628565597" sldId="256"/>
+            <ac:spMk id="17" creationId="{6A96BD85-23FF-D3F3-F371-A14D3896DA99}"/>
+          </ac:spMkLst>
+        </pc:spChg>
+        <pc:spChg chg="mod topLvl">
+          <ac:chgData name="Yusuke Funabashi" userId="273debb854664e28" providerId="LiveId" clId="{48FBA1EA-6036-4710-8B2F-1A1BB3DF75BF}" dt="2024-06-26T07:31:47.423" v="106" actId="164"/>
+          <ac:spMkLst>
+            <pc:docMk/>
+            <pc:sldMk cId="3628565597" sldId="256"/>
+            <ac:spMk id="19" creationId="{03CC8302-429C-B5E3-0C73-232207665997}"/>
+          </ac:spMkLst>
+        </pc:spChg>
+        <pc:spChg chg="mod topLvl">
+          <ac:chgData name="Yusuke Funabashi" userId="273debb854664e28" providerId="LiveId" clId="{48FBA1EA-6036-4710-8B2F-1A1BB3DF75BF}" dt="2024-06-26T07:31:47.423" v="106" actId="164"/>
+          <ac:spMkLst>
+            <pc:docMk/>
+            <pc:sldMk cId="3628565597" sldId="256"/>
+            <ac:spMk id="33" creationId="{70B05B8E-9AA5-469E-D145-E1D026A21FD0}"/>
+          </ac:spMkLst>
+        </pc:spChg>
+        <pc:spChg chg="mod topLvl">
+          <ac:chgData name="Yusuke Funabashi" userId="273debb854664e28" providerId="LiveId" clId="{48FBA1EA-6036-4710-8B2F-1A1BB3DF75BF}" dt="2024-06-26T07:31:47.423" v="106" actId="164"/>
+          <ac:spMkLst>
+            <pc:docMk/>
+            <pc:sldMk cId="3628565597" sldId="256"/>
+            <ac:spMk id="34" creationId="{8826A6F9-16AB-C703-A55B-7639E564E734}"/>
+          </ac:spMkLst>
+        </pc:spChg>
+        <pc:spChg chg="mod topLvl">
+          <ac:chgData name="Yusuke Funabashi" userId="273debb854664e28" providerId="LiveId" clId="{48FBA1EA-6036-4710-8B2F-1A1BB3DF75BF}" dt="2024-06-26T07:31:47.423" v="106" actId="164"/>
+          <ac:spMkLst>
+            <pc:docMk/>
+            <pc:sldMk cId="3628565597" sldId="256"/>
+            <ac:spMk id="41" creationId="{658F00AC-A761-ED5F-57B1-F3C3F357EA39}"/>
+          </ac:spMkLst>
+        </pc:spChg>
+        <pc:spChg chg="mod topLvl">
+          <ac:chgData name="Yusuke Funabashi" userId="273debb854664e28" providerId="LiveId" clId="{48FBA1EA-6036-4710-8B2F-1A1BB3DF75BF}" dt="2024-06-26T07:31:47.423" v="106" actId="164"/>
+          <ac:spMkLst>
+            <pc:docMk/>
+            <pc:sldMk cId="3628565597" sldId="256"/>
+            <ac:spMk id="43" creationId="{9EBE1D6D-BA33-2614-1418-2C18BCE2076C}"/>
+          </ac:spMkLst>
+        </pc:spChg>
+        <pc:spChg chg="mod topLvl">
+          <ac:chgData name="Yusuke Funabashi" userId="273debb854664e28" providerId="LiveId" clId="{48FBA1EA-6036-4710-8B2F-1A1BB3DF75BF}" dt="2024-06-26T07:31:47.423" v="106" actId="164"/>
+          <ac:spMkLst>
+            <pc:docMk/>
+            <pc:sldMk cId="3628565597" sldId="256"/>
+            <ac:spMk id="45" creationId="{C70FDAB2-75E1-E6AB-68D5-2F99A5FE58A5}"/>
+          </ac:spMkLst>
+        </pc:spChg>
+        <pc:spChg chg="mod topLvl">
+          <ac:chgData name="Yusuke Funabashi" userId="273debb854664e28" providerId="LiveId" clId="{48FBA1EA-6036-4710-8B2F-1A1BB3DF75BF}" dt="2024-06-26T07:31:47.423" v="106" actId="164"/>
+          <ac:spMkLst>
+            <pc:docMk/>
+            <pc:sldMk cId="3628565597" sldId="256"/>
+            <ac:spMk id="50" creationId="{77DF4918-E9B9-75F7-CEA6-61AA9268029D}"/>
+          </ac:spMkLst>
+        </pc:spChg>
+        <pc:spChg chg="mod topLvl">
+          <ac:chgData name="Yusuke Funabashi" userId="273debb854664e28" providerId="LiveId" clId="{48FBA1EA-6036-4710-8B2F-1A1BB3DF75BF}" dt="2024-06-26T07:31:47.423" v="106" actId="164"/>
+          <ac:spMkLst>
+            <pc:docMk/>
+            <pc:sldMk cId="3628565597" sldId="256"/>
+            <ac:spMk id="52" creationId="{1AB3C655-DF1F-FFAF-76D3-D113C25F04FA}"/>
+          </ac:spMkLst>
+        </pc:spChg>
+        <pc:grpChg chg="add del mod">
+          <ac:chgData name="Yusuke Funabashi" userId="273debb854664e28" providerId="LiveId" clId="{48FBA1EA-6036-4710-8B2F-1A1BB3DF75BF}" dt="2024-06-26T07:25:35.599" v="34" actId="165"/>
+          <ac:grpSpMkLst>
+            <pc:docMk/>
+            <pc:sldMk cId="3628565597" sldId="256"/>
+            <ac:grpSpMk id="2" creationId="{5DA3D4DB-149E-9637-4DAF-9E999CC82790}"/>
+          </ac:grpSpMkLst>
+        </pc:grpChg>
+        <pc:grpChg chg="del">
+          <ac:chgData name="Yusuke Funabashi" userId="273debb854664e28" providerId="LiveId" clId="{48FBA1EA-6036-4710-8B2F-1A1BB3DF75BF}" dt="2024-06-26T07:21:37.083" v="1" actId="165"/>
+          <ac:grpSpMkLst>
+            <pc:docMk/>
+            <pc:sldMk cId="3628565597" sldId="256"/>
+            <ac:grpSpMk id="56" creationId="{E42E0F28-0225-8BC8-3D5A-A00F30938569}"/>
+          </ac:grpSpMkLst>
+        </pc:grpChg>
+        <pc:grpChg chg="add mod">
+          <ac:chgData name="Yusuke Funabashi" userId="273debb854664e28" providerId="LiveId" clId="{48FBA1EA-6036-4710-8B2F-1A1BB3DF75BF}" dt="2024-06-26T07:31:47.423" v="106" actId="164"/>
+          <ac:grpSpMkLst>
+            <pc:docMk/>
+            <pc:sldMk cId="3628565597" sldId="256"/>
+            <ac:grpSpMk id="57" creationId="{DC67F7C0-BA64-31D0-6800-62A2A39FFBC4}"/>
+          </ac:grpSpMkLst>
+        </pc:grpChg>
+        <pc:cxnChg chg="mod topLvl">
+          <ac:chgData name="Yusuke Funabashi" userId="273debb854664e28" providerId="LiveId" clId="{48FBA1EA-6036-4710-8B2F-1A1BB3DF75BF}" dt="2024-06-26T07:31:47.423" v="106" actId="164"/>
+          <ac:cxnSpMkLst>
+            <pc:docMk/>
+            <pc:sldMk cId="3628565597" sldId="256"/>
+            <ac:cxnSpMk id="7" creationId="{673B0D4D-4725-79D9-39D5-1F88E8350A07}"/>
+          </ac:cxnSpMkLst>
+        </pc:cxnChg>
+        <pc:cxnChg chg="mod topLvl">
+          <ac:chgData name="Yusuke Funabashi" userId="273debb854664e28" providerId="LiveId" clId="{48FBA1EA-6036-4710-8B2F-1A1BB3DF75BF}" dt="2024-06-26T07:31:47.423" v="106" actId="164"/>
+          <ac:cxnSpMkLst>
+            <pc:docMk/>
+            <pc:sldMk cId="3628565597" sldId="256"/>
+            <ac:cxnSpMk id="10" creationId="{1076FC1C-409B-35EF-4BC1-9817CB7E8F2E}"/>
+          </ac:cxnSpMkLst>
+        </pc:cxnChg>
+        <pc:cxnChg chg="mod topLvl">
+          <ac:chgData name="Yusuke Funabashi" userId="273debb854664e28" providerId="LiveId" clId="{48FBA1EA-6036-4710-8B2F-1A1BB3DF75BF}" dt="2024-06-26T07:31:47.423" v="106" actId="164"/>
+          <ac:cxnSpMkLst>
+            <pc:docMk/>
+            <pc:sldMk cId="3628565597" sldId="256"/>
+            <ac:cxnSpMk id="13" creationId="{9B175439-9038-756A-CA7C-FC90FCF4667C}"/>
+          </ac:cxnSpMkLst>
+        </pc:cxnChg>
+        <pc:cxnChg chg="mod topLvl">
+          <ac:chgData name="Yusuke Funabashi" userId="273debb854664e28" providerId="LiveId" clId="{48FBA1EA-6036-4710-8B2F-1A1BB3DF75BF}" dt="2024-06-26T07:31:47.423" v="106" actId="164"/>
+          <ac:cxnSpMkLst>
+            <pc:docMk/>
+            <pc:sldMk cId="3628565597" sldId="256"/>
+            <ac:cxnSpMk id="16" creationId="{7A472126-BEDC-39BF-28F7-8E2447BF7A5C}"/>
+          </ac:cxnSpMkLst>
+        </pc:cxnChg>
+        <pc:cxnChg chg="mod topLvl">
+          <ac:chgData name="Yusuke Funabashi" userId="273debb854664e28" providerId="LiveId" clId="{48FBA1EA-6036-4710-8B2F-1A1BB3DF75BF}" dt="2024-06-26T07:31:47.423" v="106" actId="164"/>
+          <ac:cxnSpMkLst>
+            <pc:docMk/>
+            <pc:sldMk cId="3628565597" sldId="256"/>
+            <ac:cxnSpMk id="18" creationId="{D4544B73-1585-1EF0-FD7E-D93E0807D5B4}"/>
+          </ac:cxnSpMkLst>
+        </pc:cxnChg>
+        <pc:cxnChg chg="mod topLvl">
+          <ac:chgData name="Yusuke Funabashi" userId="273debb854664e28" providerId="LiveId" clId="{48FBA1EA-6036-4710-8B2F-1A1BB3DF75BF}" dt="2024-06-26T07:31:47.423" v="106" actId="164"/>
+          <ac:cxnSpMkLst>
+            <pc:docMk/>
+            <pc:sldMk cId="3628565597" sldId="256"/>
+            <ac:cxnSpMk id="20" creationId="{9799A103-469D-E7D6-C307-CC2FFE09A9C8}"/>
+          </ac:cxnSpMkLst>
+        </pc:cxnChg>
+        <pc:cxnChg chg="mod topLvl">
+          <ac:chgData name="Yusuke Funabashi" userId="273debb854664e28" providerId="LiveId" clId="{48FBA1EA-6036-4710-8B2F-1A1BB3DF75BF}" dt="2024-06-26T07:31:47.423" v="106" actId="164"/>
+          <ac:cxnSpMkLst>
+            <pc:docMk/>
+            <pc:sldMk cId="3628565597" sldId="256"/>
+            <ac:cxnSpMk id="24" creationId="{A22A20D9-DA18-866B-F3A6-1CC492DA6EDB}"/>
+          </ac:cxnSpMkLst>
+        </pc:cxnChg>
+        <pc:cxnChg chg="add mod">
+          <ac:chgData name="Yusuke Funabashi" userId="273debb854664e28" providerId="LiveId" clId="{48FBA1EA-6036-4710-8B2F-1A1BB3DF75BF}" dt="2024-06-26T07:31:47.423" v="106" actId="164"/>
+          <ac:cxnSpMkLst>
+            <pc:docMk/>
+            <pc:sldMk cId="3628565597" sldId="256"/>
+            <ac:cxnSpMk id="36" creationId="{AE01E98D-4662-5D2F-52CA-9F7CF349244B}"/>
+          </ac:cxnSpMkLst>
+        </pc:cxnChg>
+        <pc:cxnChg chg="add mod">
+          <ac:chgData name="Yusuke Funabashi" userId="273debb854664e28" providerId="LiveId" clId="{48FBA1EA-6036-4710-8B2F-1A1BB3DF75BF}" dt="2024-06-26T07:31:47.423" v="106" actId="164"/>
+          <ac:cxnSpMkLst>
+            <pc:docMk/>
+            <pc:sldMk cId="3628565597" sldId="256"/>
+            <ac:cxnSpMk id="39" creationId="{E3DB2B22-3DE3-8DC8-C544-C1680209AF0A}"/>
+          </ac:cxnSpMkLst>
+        </pc:cxnChg>
+        <pc:cxnChg chg="mod topLvl">
+          <ac:chgData name="Yusuke Funabashi" userId="273debb854664e28" providerId="LiveId" clId="{48FBA1EA-6036-4710-8B2F-1A1BB3DF75BF}" dt="2024-06-26T07:31:47.423" v="106" actId="164"/>
+          <ac:cxnSpMkLst>
+            <pc:docMk/>
+            <pc:sldMk cId="3628565597" sldId="256"/>
+            <ac:cxnSpMk id="40" creationId="{1D7E98A4-A72C-BD77-6225-C0641BC31126}"/>
+          </ac:cxnSpMkLst>
+        </pc:cxnChg>
+        <pc:cxnChg chg="mod topLvl">
+          <ac:chgData name="Yusuke Funabashi" userId="273debb854664e28" providerId="LiveId" clId="{48FBA1EA-6036-4710-8B2F-1A1BB3DF75BF}" dt="2024-06-26T07:31:47.423" v="106" actId="164"/>
+          <ac:cxnSpMkLst>
+            <pc:docMk/>
+            <pc:sldMk cId="3628565597" sldId="256"/>
+            <ac:cxnSpMk id="42" creationId="{C6D9C785-78E8-2C5E-08EE-F1391021F2FA}"/>
+          </ac:cxnSpMkLst>
+        </pc:cxnChg>
+        <pc:cxnChg chg="mod topLvl">
+          <ac:chgData name="Yusuke Funabashi" userId="273debb854664e28" providerId="LiveId" clId="{48FBA1EA-6036-4710-8B2F-1A1BB3DF75BF}" dt="2024-06-26T07:31:47.423" v="106" actId="164"/>
+          <ac:cxnSpMkLst>
+            <pc:docMk/>
+            <pc:sldMk cId="3628565597" sldId="256"/>
+            <ac:cxnSpMk id="44" creationId="{9DFD7554-7C9D-ECC6-88C9-9B726B751AB6}"/>
+          </ac:cxnSpMkLst>
+        </pc:cxnChg>
+        <pc:cxnChg chg="mod topLvl">
+          <ac:chgData name="Yusuke Funabashi" userId="273debb854664e28" providerId="LiveId" clId="{48FBA1EA-6036-4710-8B2F-1A1BB3DF75BF}" dt="2024-06-26T07:31:47.423" v="106" actId="164"/>
           <ac:cxnSpMkLst>
             <pc:docMk/>
             <pc:sldMk cId="3628565597" sldId="256"/>
             <ac:cxnSpMk id="46" creationId="{C68A8CC4-75F8-8B7E-6A68-AFAD3CB8D40B}"/>
+          </ac:cxnSpMkLst>
+        </pc:cxnChg>
+        <pc:cxnChg chg="del mod topLvl">
+          <ac:chgData name="Yusuke Funabashi" userId="273debb854664e28" providerId="LiveId" clId="{48FBA1EA-6036-4710-8B2F-1A1BB3DF75BF}" dt="2024-06-26T07:28:01.049" v="62" actId="478"/>
+          <ac:cxnSpMkLst>
+            <pc:docMk/>
+            <pc:sldMk cId="3628565597" sldId="256"/>
+            <ac:cxnSpMk id="49" creationId="{278A1CF3-89A9-2DAD-B245-4E51CDD4F820}"/>
+          </ac:cxnSpMkLst>
+        </pc:cxnChg>
+        <pc:cxnChg chg="del mod topLvl">
+          <ac:chgData name="Yusuke Funabashi" userId="273debb854664e28" providerId="LiveId" clId="{48FBA1EA-6036-4710-8B2F-1A1BB3DF75BF}" dt="2024-06-26T07:28:02.333" v="63" actId="478"/>
+          <ac:cxnSpMkLst>
+            <pc:docMk/>
+            <pc:sldMk cId="3628565597" sldId="256"/>
+            <ac:cxnSpMk id="51" creationId="{123C5890-003E-2C3F-1DE1-519DE945BC83}"/>
           </ac:cxnSpMkLst>
         </pc:cxnChg>
       </pc:sldChg>
@@ -3664,10 +3897,10 @@
       </p:grpSpPr>
       <p:grpSp>
         <p:nvGrpSpPr>
-          <p:cNvPr id="56" name="グループ化 55">
-            <a:extLst>
-              <a:ext uri="{FF2B5EF4-FFF2-40B4-BE49-F238E27FC236}">
-                <a16:creationId xmlns:a16="http://schemas.microsoft.com/office/drawing/2014/main" id="{E42E0F28-0225-8BC8-3D5A-A00F30938569}"/>
+          <p:cNvPr id="57" name="グループ化 56">
+            <a:extLst>
+              <a:ext uri="{FF2B5EF4-FFF2-40B4-BE49-F238E27FC236}">
+                <a16:creationId xmlns:a16="http://schemas.microsoft.com/office/drawing/2014/main" id="{DC67F7C0-BA64-31D0-6800-62A2A39FFBC4}"/>
               </a:ext>
             </a:extLst>
           </p:cNvPr>
@@ -3676,10 +3909,10 @@
         </p:nvGrpSpPr>
         <p:grpSpPr>
           <a:xfrm>
-            <a:off x="1056000" y="116999"/>
-            <a:ext cx="5760300" cy="6686552"/>
-            <a:chOff x="1056000" y="116999"/>
-            <a:chExt cx="5760300" cy="6686552"/>
+            <a:off x="1072589" y="333000"/>
+            <a:ext cx="4807411" cy="6164565"/>
+            <a:chOff x="1072589" y="333000"/>
+            <a:chExt cx="4807411" cy="6164565"/>
           </a:xfrm>
         </p:grpSpPr>
         <p:sp>
@@ -3696,8 +3929,8 @@
           </p:nvSpPr>
           <p:spPr>
             <a:xfrm>
-              <a:off x="1056000" y="116999"/>
-              <a:ext cx="1440000" cy="720000"/>
+              <a:off x="1072589" y="333001"/>
+              <a:ext cx="1260000" cy="540000"/>
             </a:xfrm>
             <a:prstGeom prst="rect">
               <a:avLst/>
@@ -3736,20 +3969,7 @@
                   <a:latin typeface="ＭＳ 明朝" panose="02020609040205080304" pitchFamily="17" charset="-128"/>
                   <a:ea typeface="ＭＳ 明朝" panose="02020609040205080304" pitchFamily="17" charset="-128"/>
                 </a:rPr>
-                <a:t>シミュレータ</a:t>
-              </a:r>
-              <a:endParaRPr lang="en-US" altLang="ja-JP" sz="900" dirty="0">
-                <a:latin typeface="ＭＳ 明朝" panose="02020609040205080304" pitchFamily="17" charset="-128"/>
-                <a:ea typeface="ＭＳ 明朝" panose="02020609040205080304" pitchFamily="17" charset="-128"/>
-              </a:endParaRPr>
-            </a:p>
-            <a:p>
-              <a:r>
-                <a:rPr lang="ja-JP" altLang="en-US" sz="900" dirty="0">
-                  <a:latin typeface="ＭＳ 明朝" panose="02020609040205080304" pitchFamily="17" charset="-128"/>
-                  <a:ea typeface="ＭＳ 明朝" panose="02020609040205080304" pitchFamily="17" charset="-128"/>
-                </a:rPr>
-                <a:t>メイン</a:t>
+                <a:t>シミュレータメイン</a:t>
               </a:r>
               <a:endParaRPr lang="en-US" altLang="ja-JP" sz="900" dirty="0">
                 <a:latin typeface="ＭＳ 明朝" panose="02020609040205080304" pitchFamily="17" charset="-128"/>
@@ -3775,9 +3995,9 @@
             <p:nvPr/>
           </p:nvCxnSpPr>
           <p:spPr>
-            <a:xfrm>
-              <a:off x="2496000" y="476999"/>
-              <a:ext cx="720000" cy="0"/>
+            <a:xfrm flipV="1">
+              <a:off x="2332589" y="603000"/>
+              <a:ext cx="521907" cy="1"/>
             </a:xfrm>
             <a:prstGeom prst="line">
               <a:avLst/>
@@ -3817,8 +4037,8 @@
           </p:nvSpPr>
           <p:spPr>
             <a:xfrm>
-              <a:off x="3216000" y="116999"/>
-              <a:ext cx="1440000" cy="720000"/>
+              <a:off x="2854496" y="333000"/>
+              <a:ext cx="1260000" cy="540000"/>
             </a:xfrm>
             <a:prstGeom prst="rect">
               <a:avLst/>
@@ -3892,8 +4112,8 @@
           </p:nvCxnSpPr>
           <p:spPr>
             <a:xfrm>
-              <a:off x="2856000" y="476999"/>
-              <a:ext cx="0" cy="4207836"/>
+              <a:off x="2557511" y="603000"/>
+              <a:ext cx="0" cy="1818002"/>
             </a:xfrm>
             <a:prstGeom prst="line">
               <a:avLst/>
@@ -3933,8 +4153,8 @@
           </p:nvCxnSpPr>
           <p:spPr>
             <a:xfrm>
-              <a:off x="2856000" y="1269001"/>
-              <a:ext cx="360000" cy="0"/>
+              <a:off x="2557511" y="1283353"/>
+              <a:ext cx="296984" cy="0"/>
             </a:xfrm>
             <a:prstGeom prst="line">
               <a:avLst/>
@@ -3976,8 +4196,8 @@
           </p:nvSpPr>
           <p:spPr>
             <a:xfrm>
-              <a:off x="3216000" y="945833"/>
-              <a:ext cx="1440000" cy="720000"/>
+              <a:off x="2854496" y="957001"/>
+              <a:ext cx="1260000" cy="540000"/>
             </a:xfrm>
             <a:prstGeom prst="rect">
               <a:avLst/>
@@ -4020,12 +4240,6 @@
                 <a:ea typeface="ＭＳ 明朝" panose="02020609040205080304" pitchFamily="17" charset="-128"/>
               </a:endParaRPr>
             </a:p>
-            <a:p>
-              <a:endParaRPr kumimoji="1" lang="ja-JP" altLang="en-US" sz="900" dirty="0">
-                <a:latin typeface="ＭＳ 明朝" panose="02020609040205080304" pitchFamily="17" charset="-128"/>
-                <a:ea typeface="ＭＳ 明朝" panose="02020609040205080304" pitchFamily="17" charset="-128"/>
-              </a:endParaRPr>
-            </a:p>
           </p:txBody>
         </p:sp>
         <p:cxnSp>
@@ -4042,8 +4256,8 @@
           </p:nvCxnSpPr>
           <p:spPr>
             <a:xfrm>
-              <a:off x="2856000" y="2097834"/>
-              <a:ext cx="360000" cy="0"/>
+              <a:off x="2557511" y="1967104"/>
+              <a:ext cx="296984" cy="0"/>
             </a:xfrm>
             <a:prstGeom prst="line">
               <a:avLst/>
@@ -4085,8 +4299,8 @@
           </p:nvSpPr>
           <p:spPr>
             <a:xfrm>
-              <a:off x="3216000" y="1774666"/>
-              <a:ext cx="1440000" cy="720000"/>
+              <a:off x="2854496" y="1581002"/>
+              <a:ext cx="1260000" cy="540000"/>
             </a:xfrm>
             <a:prstGeom prst="rect">
               <a:avLst/>
@@ -4158,8 +4372,8 @@
           </p:nvCxnSpPr>
           <p:spPr>
             <a:xfrm>
-              <a:off x="2856000" y="2926666"/>
-              <a:ext cx="360000" cy="0"/>
+              <a:off x="2557511" y="2421002"/>
+              <a:ext cx="296984" cy="0"/>
             </a:xfrm>
             <a:prstGeom prst="line">
               <a:avLst/>
@@ -4201,8 +4415,8 @@
           </p:nvSpPr>
           <p:spPr>
             <a:xfrm>
-              <a:off x="3216000" y="2603498"/>
-              <a:ext cx="1440000" cy="720000"/>
+              <a:off x="2854496" y="2205002"/>
+              <a:ext cx="1260000" cy="540000"/>
             </a:xfrm>
             <a:prstGeom prst="rect">
               <a:avLst/>
@@ -4238,20 +4452,7 @@
                   <a:latin typeface="Century" panose="02040604050505020304" pitchFamily="18" charset="0"/>
                   <a:ea typeface="ＭＳ 明朝" panose="02020609040205080304" pitchFamily="17" charset="-128"/>
                 </a:rPr>
-                <a:t>オブジェクトコード</a:t>
-              </a:r>
-              <a:endParaRPr lang="en-US" altLang="ja-JP" sz="900" dirty="0">
-                <a:latin typeface="Century" panose="02040604050505020304" pitchFamily="18" charset="0"/>
-                <a:ea typeface="ＭＳ 明朝" panose="02020609040205080304" pitchFamily="17" charset="-128"/>
-              </a:endParaRPr>
-            </a:p>
-            <a:p>
-              <a:r>
-                <a:rPr lang="ja-JP" altLang="en-US" sz="900" dirty="0">
-                  <a:latin typeface="Century" panose="02040604050505020304" pitchFamily="18" charset="0"/>
-                  <a:ea typeface="ＭＳ 明朝" panose="02020609040205080304" pitchFamily="17" charset="-128"/>
-                </a:rPr>
-                <a:t>実行処理</a:t>
+                <a:t>オブジェクトコード実行処理</a:t>
               </a:r>
             </a:p>
           </p:txBody>
@@ -4267,13 +4468,15 @@
             </p:cNvPr>
             <p:cNvCxnSpPr>
               <a:cxnSpLocks/>
+              <a:stCxn id="19" idx="3"/>
+              <a:endCxn id="33" idx="1"/>
             </p:cNvCxnSpPr>
             <p:nvPr/>
           </p:nvCxnSpPr>
           <p:spPr>
             <a:xfrm>
-              <a:off x="4656000" y="2997001"/>
-              <a:ext cx="720000" cy="0"/>
+              <a:off x="4114496" y="2475002"/>
+              <a:ext cx="505504" cy="0"/>
             </a:xfrm>
             <a:prstGeom prst="line">
               <a:avLst/>
@@ -4315,8 +4518,8 @@
           </p:nvCxnSpPr>
           <p:spPr>
             <a:xfrm flipH="1">
-              <a:off x="4997820" y="2997001"/>
-              <a:ext cx="18180" cy="3446551"/>
+              <a:off x="4368077" y="2475002"/>
+              <a:ext cx="14748" cy="3752562"/>
             </a:xfrm>
             <a:prstGeom prst="line">
               <a:avLst/>
@@ -4358,8 +4561,8 @@
           </p:nvSpPr>
           <p:spPr>
             <a:xfrm>
-              <a:off x="5376000" y="2636999"/>
-              <a:ext cx="1440000" cy="720000"/>
+              <a:off x="4620000" y="2205002"/>
+              <a:ext cx="1260000" cy="540000"/>
             </a:xfrm>
             <a:prstGeom prst="rect">
               <a:avLst/>
@@ -4439,8 +4642,8 @@
           </p:nvSpPr>
           <p:spPr>
             <a:xfrm>
-              <a:off x="5376300" y="3499334"/>
-              <a:ext cx="1440000" cy="720000"/>
+              <a:off x="4620000" y="2830429"/>
+              <a:ext cx="1260000" cy="540000"/>
             </a:xfrm>
             <a:prstGeom prst="rect">
               <a:avLst/>
@@ -4514,14 +4717,15 @@
               </a:extLst>
             </p:cNvPr>
             <p:cNvCxnSpPr>
+              <a:cxnSpLocks/>
               <a:endCxn id="34" idx="1"/>
             </p:cNvCxnSpPr>
             <p:nvPr/>
           </p:nvCxnSpPr>
           <p:spPr>
-            <a:xfrm flipV="1">
-              <a:off x="5016000" y="3859334"/>
-              <a:ext cx="360300" cy="1667"/>
+            <a:xfrm>
+              <a:off x="4382825" y="3100429"/>
+              <a:ext cx="237175" cy="0"/>
             </a:xfrm>
             <a:prstGeom prst="line">
               <a:avLst/>
@@ -4563,8 +4767,8 @@
           </p:nvSpPr>
           <p:spPr>
             <a:xfrm>
-              <a:off x="5376000" y="4361666"/>
-              <a:ext cx="1440000" cy="720000"/>
+              <a:off x="4620000" y="3455856"/>
+              <a:ext cx="1260000" cy="540000"/>
             </a:xfrm>
             <a:prstGeom prst="rect">
               <a:avLst/>
@@ -4632,14 +4836,15 @@
               </a:extLst>
             </p:cNvPr>
             <p:cNvCxnSpPr>
+              <a:cxnSpLocks/>
               <a:endCxn id="41" idx="1"/>
             </p:cNvCxnSpPr>
             <p:nvPr/>
           </p:nvCxnSpPr>
           <p:spPr>
-            <a:xfrm flipV="1">
-              <a:off x="5015700" y="4721666"/>
-              <a:ext cx="360300" cy="1668"/>
+            <a:xfrm>
+              <a:off x="4375326" y="3725856"/>
+              <a:ext cx="244674" cy="0"/>
             </a:xfrm>
             <a:prstGeom prst="line">
               <a:avLst/>
@@ -4681,8 +4886,8 @@
           </p:nvSpPr>
           <p:spPr>
             <a:xfrm>
-              <a:off x="5358120" y="5222332"/>
-              <a:ext cx="1440000" cy="720000"/>
+              <a:off x="4620000" y="4081283"/>
+              <a:ext cx="1260000" cy="540000"/>
             </a:xfrm>
             <a:prstGeom prst="rect">
               <a:avLst/>
@@ -4756,14 +4961,15 @@
               </a:extLst>
             </p:cNvPr>
             <p:cNvCxnSpPr>
+              <a:cxnSpLocks/>
               <a:endCxn id="43" idx="1"/>
             </p:cNvCxnSpPr>
             <p:nvPr/>
           </p:nvCxnSpPr>
           <p:spPr>
-            <a:xfrm flipV="1">
-              <a:off x="4997820" y="5582332"/>
-              <a:ext cx="360300" cy="1668"/>
+            <a:xfrm>
+              <a:off x="4375326" y="4351283"/>
+              <a:ext cx="244674" cy="0"/>
             </a:xfrm>
             <a:prstGeom prst="line">
               <a:avLst/>
@@ -4805,8 +5011,8 @@
           </p:nvSpPr>
           <p:spPr>
             <a:xfrm>
-              <a:off x="5376000" y="6083551"/>
-              <a:ext cx="1440000" cy="720000"/>
+              <a:off x="4620000" y="4706710"/>
+              <a:ext cx="1260000" cy="540000"/>
             </a:xfrm>
             <a:prstGeom prst="rect">
               <a:avLst/>
@@ -4887,49 +5093,8 @@
           </p:nvCxnSpPr>
           <p:spPr>
             <a:xfrm>
-              <a:off x="4997820" y="6443551"/>
-              <a:ext cx="378180" cy="0"/>
-            </a:xfrm>
-            <a:prstGeom prst="line">
-              <a:avLst/>
-            </a:prstGeom>
-            <a:ln w="3175">
-              <a:solidFill>
-                <a:schemeClr val="tx1"/>
-              </a:solidFill>
-            </a:ln>
-          </p:spPr>
-          <p:style>
-            <a:lnRef idx="2">
-              <a:schemeClr val="accent1"/>
-            </a:lnRef>
-            <a:fillRef idx="0">
-              <a:schemeClr val="accent1"/>
-            </a:fillRef>
-            <a:effectRef idx="1">
-              <a:schemeClr val="accent1"/>
-            </a:effectRef>
-            <a:fontRef idx="minor">
-              <a:schemeClr val="tx1"/>
-            </a:fontRef>
-          </p:style>
-        </p:cxnSp>
-        <p:cxnSp>
-          <p:nvCxnSpPr>
-            <p:cNvPr id="49" name="直線コネクタ 48">
-              <a:extLst>
-                <a:ext uri="{FF2B5EF4-FFF2-40B4-BE49-F238E27FC236}">
-                  <a16:creationId xmlns:a16="http://schemas.microsoft.com/office/drawing/2014/main" id="{278A1CF3-89A9-2DAD-B245-4E51CDD4F820}"/>
-                </a:ext>
-              </a:extLst>
-            </p:cNvPr>
-            <p:cNvCxnSpPr/>
-            <p:nvPr/>
-          </p:nvCxnSpPr>
-          <p:spPr>
-            <a:xfrm>
-              <a:off x="2856000" y="3805568"/>
-              <a:ext cx="360000" cy="0"/>
+              <a:off x="4375326" y="4976710"/>
+              <a:ext cx="244674" cy="0"/>
             </a:xfrm>
             <a:prstGeom prst="line">
               <a:avLst/>
@@ -4971,8 +5136,8 @@
           </p:nvSpPr>
           <p:spPr>
             <a:xfrm>
-              <a:off x="3216000" y="3482400"/>
-              <a:ext cx="1440000" cy="720000"/>
+              <a:off x="4620000" y="5332137"/>
+              <a:ext cx="1260000" cy="540000"/>
             </a:xfrm>
             <a:prstGeom prst="rect">
               <a:avLst/>
@@ -5008,7 +5173,20 @@
                   <a:latin typeface="Century" panose="02040604050505020304" pitchFamily="18" charset="0"/>
                   <a:ea typeface="ＭＳ 明朝" panose="02020609040205080304" pitchFamily="17" charset="-128"/>
                 </a:rPr>
-                <a:t>トレースリスト表示</a:t>
+                <a:t>トレースリスト</a:t>
+              </a:r>
+              <a:endParaRPr lang="en-US" altLang="ja-JP" sz="900" dirty="0">
+                <a:latin typeface="Century" panose="02040604050505020304" pitchFamily="18" charset="0"/>
+                <a:ea typeface="ＭＳ 明朝" panose="02020609040205080304" pitchFamily="17" charset="-128"/>
+              </a:endParaRPr>
+            </a:p>
+            <a:p>
+              <a:r>
+                <a:rPr lang="ja-JP" altLang="en-US" sz="900" dirty="0">
+                  <a:latin typeface="Century" panose="02040604050505020304" pitchFamily="18" charset="0"/>
+                  <a:ea typeface="ＭＳ 明朝" panose="02020609040205080304" pitchFamily="17" charset="-128"/>
+                </a:rPr>
+                <a:t>表示</a:t>
               </a:r>
               <a:endParaRPr lang="en-US" altLang="ja-JP" sz="900" dirty="0">
                 <a:latin typeface="ＭＳ 明朝" panose="02020609040205080304" pitchFamily="17" charset="-128"/>
@@ -5017,47 +5195,6 @@
             </a:p>
           </p:txBody>
         </p:sp>
-        <p:cxnSp>
-          <p:nvCxnSpPr>
-            <p:cNvPr id="51" name="直線コネクタ 50">
-              <a:extLst>
-                <a:ext uri="{FF2B5EF4-FFF2-40B4-BE49-F238E27FC236}">
-                  <a16:creationId xmlns:a16="http://schemas.microsoft.com/office/drawing/2014/main" id="{123C5890-003E-2C3F-1DE1-519DE945BC83}"/>
-                </a:ext>
-              </a:extLst>
-            </p:cNvPr>
-            <p:cNvCxnSpPr/>
-            <p:nvPr/>
-          </p:nvCxnSpPr>
-          <p:spPr>
-            <a:xfrm>
-              <a:off x="2856000" y="4684835"/>
-              <a:ext cx="360000" cy="0"/>
-            </a:xfrm>
-            <a:prstGeom prst="line">
-              <a:avLst/>
-            </a:prstGeom>
-            <a:ln w="3175">
-              <a:solidFill>
-                <a:schemeClr val="tx1"/>
-              </a:solidFill>
-            </a:ln>
-          </p:spPr>
-          <p:style>
-            <a:lnRef idx="2">
-              <a:schemeClr val="accent1"/>
-            </a:lnRef>
-            <a:fillRef idx="0">
-              <a:schemeClr val="accent1"/>
-            </a:fillRef>
-            <a:effectRef idx="1">
-              <a:schemeClr val="accent1"/>
-            </a:effectRef>
-            <a:fontRef idx="minor">
-              <a:schemeClr val="tx1"/>
-            </a:fontRef>
-          </p:style>
-        </p:cxnSp>
         <p:sp>
           <p:nvSpPr>
             <p:cNvPr id="52" name="テキスト ボックス 51">
@@ -5074,8 +5211,8 @@
           </p:nvSpPr>
           <p:spPr>
             <a:xfrm>
-              <a:off x="3216000" y="4361667"/>
-              <a:ext cx="1440000" cy="720000"/>
+              <a:off x="4620000" y="5957565"/>
+              <a:ext cx="1260000" cy="540000"/>
             </a:xfrm>
             <a:prstGeom prst="rect">
               <a:avLst/>
@@ -5120,6 +5257,94 @@
             </a:p>
           </p:txBody>
         </p:sp>
+        <p:cxnSp>
+          <p:nvCxnSpPr>
+            <p:cNvPr id="36" name="直線コネクタ 35">
+              <a:extLst>
+                <a:ext uri="{FF2B5EF4-FFF2-40B4-BE49-F238E27FC236}">
+                  <a16:creationId xmlns:a16="http://schemas.microsoft.com/office/drawing/2014/main" id="{AE01E98D-4662-5D2F-52CA-9F7CF349244B}"/>
+                </a:ext>
+              </a:extLst>
+            </p:cNvPr>
+            <p:cNvCxnSpPr>
+              <a:cxnSpLocks/>
+              <a:endCxn id="50" idx="1"/>
+            </p:cNvCxnSpPr>
+            <p:nvPr/>
+          </p:nvCxnSpPr>
+          <p:spPr>
+            <a:xfrm>
+              <a:off x="4375326" y="5602137"/>
+              <a:ext cx="244674" cy="0"/>
+            </a:xfrm>
+            <a:prstGeom prst="line">
+              <a:avLst/>
+            </a:prstGeom>
+            <a:ln w="3175">
+              <a:solidFill>
+                <a:schemeClr val="tx1"/>
+              </a:solidFill>
+            </a:ln>
+          </p:spPr>
+          <p:style>
+            <a:lnRef idx="2">
+              <a:schemeClr val="accent1"/>
+            </a:lnRef>
+            <a:fillRef idx="0">
+              <a:schemeClr val="accent1"/>
+            </a:fillRef>
+            <a:effectRef idx="1">
+              <a:schemeClr val="accent1"/>
+            </a:effectRef>
+            <a:fontRef idx="minor">
+              <a:schemeClr val="tx1"/>
+            </a:fontRef>
+          </p:style>
+        </p:cxnSp>
+        <p:cxnSp>
+          <p:nvCxnSpPr>
+            <p:cNvPr id="39" name="直線コネクタ 38">
+              <a:extLst>
+                <a:ext uri="{FF2B5EF4-FFF2-40B4-BE49-F238E27FC236}">
+                  <a16:creationId xmlns:a16="http://schemas.microsoft.com/office/drawing/2014/main" id="{E3DB2B22-3DE3-8DC8-C544-C1680209AF0A}"/>
+                </a:ext>
+              </a:extLst>
+            </p:cNvPr>
+            <p:cNvCxnSpPr>
+              <a:cxnSpLocks/>
+              <a:endCxn id="52" idx="1"/>
+            </p:cNvCxnSpPr>
+            <p:nvPr/>
+          </p:nvCxnSpPr>
+          <p:spPr>
+            <a:xfrm>
+              <a:off x="4367248" y="6227565"/>
+              <a:ext cx="252752" cy="0"/>
+            </a:xfrm>
+            <a:prstGeom prst="line">
+              <a:avLst/>
+            </a:prstGeom>
+            <a:ln w="3175">
+              <a:solidFill>
+                <a:schemeClr val="tx1"/>
+              </a:solidFill>
+            </a:ln>
+          </p:spPr>
+          <p:style>
+            <a:lnRef idx="2">
+              <a:schemeClr val="accent1"/>
+            </a:lnRef>
+            <a:fillRef idx="0">
+              <a:schemeClr val="accent1"/>
+            </a:fillRef>
+            <a:effectRef idx="1">
+              <a:schemeClr val="accent1"/>
+            </a:effectRef>
+            <a:fontRef idx="minor">
+              <a:schemeClr val="tx1"/>
+            </a:fontRef>
+          </p:style>
+        </p:cxnSp>
       </p:grpSp>
     </p:spTree>
     <p:extLst>

</xml_diff>